<commit_message>
update slides for new videos
</commit_message>
<xml_diff>
--- a/slides/Online/2020/04a - CharactersAndStrings.pptx
+++ b/slides/Online/2020/04a - CharactersAndStrings.pptx
@@ -218,7 +218,7 @@
           <a:p>
             <a:fld id="{4D7E51A5-B478-1E40-8CBB-0DAA8831E99D}" type="datetimeFigureOut">
               <a:rPr lang="en-US" smtClean="0"/>
-              <a:t>3/16/20</a:t>
+              <a:t>1/18/2022</a:t>
             </a:fld>
             <a:endParaRPr lang="en-US"/>
           </a:p>
@@ -383,7 +383,7 @@
           <a:p>
             <a:fld id="{D0ED587F-861E-6740-9643-E3DDAE89B8D6}" type="datetimeFigureOut">
               <a:rPr lang="en-US" smtClean="0"/>
-              <a:t>3/16/20</a:t>
+              <a:t>1/18/2022</a:t>
             </a:fld>
             <a:endParaRPr lang="en-US"/>
           </a:p>
@@ -6692,14 +6692,14 @@
   <p:clrMapOvr>
     <a:masterClrMapping/>
   </p:clrMapOvr>
-  <mc:AlternateContent xmlns:mc="http://schemas.openxmlformats.org/markup-compatibility/2006" xmlns:p14="http://schemas.microsoft.com/office/powerpoint/2010/main">
-    <mc:Choice Requires="p14">
-      <p:transition p14:dur="300">
+  <mc:AlternateContent xmlns:mc="http://schemas.openxmlformats.org/markup-compatibility/2006">
+    <mc:Choice xmlns:p14="http://schemas.microsoft.com/office/powerpoint/2010/main" Requires="p14">
+      <p:transition p14:dur="300" advTm="53880">
         <p:fade/>
       </p:transition>
     </mc:Choice>
-    <mc:Fallback xmlns="">
-      <p:transition>
+    <mc:Fallback>
+      <p:transition advTm="53880">
         <p:fade/>
       </p:transition>
     </mc:Fallback>
@@ -6771,7 +6771,7 @@
         <p:spPr>
           <a:xfrm>
             <a:off x="628075" y="1776682"/>
-            <a:ext cx="12561453" cy="3429913"/>
+            <a:ext cx="12561453" cy="3399136"/>
           </a:xfrm>
         </p:spPr>
         <p:txBody>
@@ -6800,72 +6800,16 @@
             </a:r>
           </a:p>
           <a:p>
-            <a:pPr lvl="1" fontAlgn="base"/>
-            <a:r>
-              <a:rPr lang="en-US" dirty="0">
-                <a:latin typeface="Consolas" panose="020B0609020204030204" pitchFamily="49" charset="0"/>
-                <a:cs typeface="Consolas" panose="020B0609020204030204" pitchFamily="49" charset="0"/>
-              </a:rPr>
-              <a:t>char </a:t>
-            </a:r>
-            <a:r>
-              <a:rPr lang="en-US" dirty="0" err="1">
-                <a:latin typeface="Consolas" panose="020B0609020204030204" pitchFamily="49" charset="0"/>
-                <a:cs typeface="Consolas" panose="020B0609020204030204" pitchFamily="49" charset="0"/>
-              </a:rPr>
-              <a:t>myChar</a:t>
-            </a:r>
-            <a:r>
-              <a:rPr lang="en-US" dirty="0">
-                <a:latin typeface="Consolas" panose="020B0609020204030204" pitchFamily="49" charset="0"/>
-                <a:cs typeface="Consolas" panose="020B0609020204030204" pitchFamily="49" charset="0"/>
-              </a:rPr>
-              <a:t> = ‘x’; // notice single quotes</a:t>
-            </a:r>
-          </a:p>
-          <a:p>
-            <a:pPr lvl="1" fontAlgn="base"/>
-            <a:r>
-              <a:rPr lang="en-US" dirty="0">
-                <a:latin typeface="Consolas" panose="020B0609020204030204" pitchFamily="49" charset="0"/>
-                <a:cs typeface="Consolas" panose="020B0609020204030204" pitchFamily="49" charset="0"/>
-              </a:rPr>
-              <a:t>char </a:t>
-            </a:r>
-            <a:r>
-              <a:rPr lang="en-US" dirty="0" err="1">
-                <a:latin typeface="Consolas" panose="020B0609020204030204" pitchFamily="49" charset="0"/>
-                <a:cs typeface="Consolas" panose="020B0609020204030204" pitchFamily="49" charset="0"/>
-              </a:rPr>
-              <a:t>newLine</a:t>
-            </a:r>
-            <a:r>
-              <a:rPr lang="en-US" dirty="0">
-                <a:latin typeface="Consolas" panose="020B0609020204030204" pitchFamily="49" charset="0"/>
-                <a:cs typeface="Consolas" panose="020B0609020204030204" pitchFamily="49" charset="0"/>
-              </a:rPr>
-              <a:t> = ‘\n’; //the invisible newline character</a:t>
-            </a:r>
-          </a:p>
-          <a:p>
-            <a:pPr lvl="1" fontAlgn="base"/>
-            <a:r>
-              <a:rPr lang="en-US" dirty="0">
-                <a:latin typeface="Consolas" panose="020B0609020204030204" pitchFamily="49" charset="0"/>
-                <a:cs typeface="Consolas" panose="020B0609020204030204" pitchFamily="49" charset="0"/>
-              </a:rPr>
-              <a:t>char myChar2 = 57; // bad idea! It sets the value to the character ‘9’</a:t>
-            </a:r>
-          </a:p>
-          <a:p>
-            <a:pPr lvl="1" fontAlgn="base"/>
-            <a:r>
-              <a:rPr lang="en-US" dirty="0">
-                <a:latin typeface="Consolas" panose="020B0609020204030204" pitchFamily="49" charset="0"/>
-                <a:cs typeface="Consolas" panose="020B0609020204030204" pitchFamily="49" charset="0"/>
-              </a:rPr>
-              <a:t>char what = (char)‘A’ + 2;  // what is now ‘C’ (used in things like the Caesar cipher)</a:t>
-            </a:r>
+            <a:pPr fontAlgn="base"/>
+            <a:endParaRPr lang="en-US" dirty="0"/>
+          </a:p>
+          <a:p>
+            <a:pPr fontAlgn="base"/>
+            <a:endParaRPr lang="en-US" dirty="0"/>
+          </a:p>
+          <a:p>
+            <a:pPr fontAlgn="base"/>
+            <a:endParaRPr lang="en-US" dirty="0"/>
           </a:p>
           <a:p>
             <a:pPr fontAlgn="base"/>
@@ -6886,6 +6830,511 @@
           </a:p>
           <a:p>
             <a:endParaRPr lang="en-US" dirty="0"/>
+          </a:p>
+        </p:txBody>
+      </p:sp>
+      <p:sp>
+        <p:nvSpPr>
+          <p:cNvPr id="6" name="TextBox 5">
+            <a:extLst>
+              <a:ext uri="{FF2B5EF4-FFF2-40B4-BE49-F238E27FC236}">
+                <a16:creationId xmlns:a16="http://schemas.microsoft.com/office/drawing/2014/main" id="{0D646D64-CCCE-4C18-BF92-92BEA82B8BC9}"/>
+              </a:ext>
+            </a:extLst>
+          </p:cNvPr>
+          <p:cNvSpPr txBox="1"/>
+          <p:nvPr/>
+        </p:nvSpPr>
+        <p:spPr>
+          <a:xfrm>
+            <a:off x="382249" y="2814530"/>
+            <a:ext cx="13053102" cy="1323439"/>
+          </a:xfrm>
+          <a:prstGeom prst="rect">
+            <a:avLst/>
+          </a:prstGeom>
+          <a:noFill/>
+        </p:spPr>
+        <p:txBody>
+          <a:bodyPr wrap="square">
+            <a:spAutoFit/>
+          </a:bodyPr>
+          <a:lstStyle/>
+          <a:p>
+            <a:r>
+              <a:rPr lang="en-US" b="1" dirty="0">
+                <a:solidFill>
+                  <a:srgbClr val="073642"/>
+                </a:solidFill>
+                <a:effectLst/>
+                <a:latin typeface="Consolas" panose="020B0609020204030204" pitchFamily="49" charset="0"/>
+              </a:rPr>
+              <a:t>char</a:t>
+            </a:r>
+            <a:r>
+              <a:rPr lang="en-US" b="0" dirty="0">
+                <a:solidFill>
+                  <a:srgbClr val="333333"/>
+                </a:solidFill>
+                <a:effectLst/>
+                <a:latin typeface="Consolas" panose="020B0609020204030204" pitchFamily="49" charset="0"/>
+              </a:rPr>
+              <a:t> </a:t>
+            </a:r>
+            <a:r>
+              <a:rPr lang="en-US" b="0" dirty="0" err="1">
+                <a:solidFill>
+                  <a:srgbClr val="268BD2"/>
+                </a:solidFill>
+                <a:effectLst/>
+                <a:latin typeface="Consolas" panose="020B0609020204030204" pitchFamily="49" charset="0"/>
+              </a:rPr>
+              <a:t>myChar</a:t>
+            </a:r>
+            <a:r>
+              <a:rPr lang="en-US" b="0" dirty="0">
+                <a:solidFill>
+                  <a:srgbClr val="333333"/>
+                </a:solidFill>
+                <a:effectLst/>
+                <a:latin typeface="Consolas" panose="020B0609020204030204" pitchFamily="49" charset="0"/>
+              </a:rPr>
+              <a:t> </a:t>
+            </a:r>
+            <a:r>
+              <a:rPr lang="en-US" b="0" dirty="0">
+                <a:solidFill>
+                  <a:srgbClr val="859900"/>
+                </a:solidFill>
+                <a:effectLst/>
+                <a:latin typeface="Consolas" panose="020B0609020204030204" pitchFamily="49" charset="0"/>
+              </a:rPr>
+              <a:t>=</a:t>
+            </a:r>
+            <a:r>
+              <a:rPr lang="en-US" b="0" dirty="0">
+                <a:solidFill>
+                  <a:srgbClr val="333333"/>
+                </a:solidFill>
+                <a:effectLst/>
+                <a:latin typeface="Consolas" panose="020B0609020204030204" pitchFamily="49" charset="0"/>
+              </a:rPr>
+              <a:t> </a:t>
+            </a:r>
+            <a:r>
+              <a:rPr lang="en-US" b="0" dirty="0">
+                <a:solidFill>
+                  <a:srgbClr val="2AA198"/>
+                </a:solidFill>
+                <a:effectLst/>
+                <a:latin typeface="Consolas" panose="020B0609020204030204" pitchFamily="49" charset="0"/>
+              </a:rPr>
+              <a:t>'x'</a:t>
+            </a:r>
+            <a:r>
+              <a:rPr lang="en-US" b="0" dirty="0">
+                <a:solidFill>
+                  <a:srgbClr val="333333"/>
+                </a:solidFill>
+                <a:effectLst/>
+                <a:latin typeface="Consolas" panose="020B0609020204030204" pitchFamily="49" charset="0"/>
+              </a:rPr>
+              <a:t>; </a:t>
+            </a:r>
+            <a:r>
+              <a:rPr lang="en-US" b="0" i="1" dirty="0">
+                <a:solidFill>
+                  <a:srgbClr val="93A1A1"/>
+                </a:solidFill>
+                <a:effectLst/>
+                <a:latin typeface="Consolas" panose="020B0609020204030204" pitchFamily="49" charset="0"/>
+              </a:rPr>
+              <a:t>// notice single quotes</a:t>
+            </a:r>
+            <a:endParaRPr lang="en-US" b="0" dirty="0">
+              <a:solidFill>
+                <a:srgbClr val="333333"/>
+              </a:solidFill>
+              <a:effectLst/>
+              <a:latin typeface="Consolas" panose="020B0609020204030204" pitchFamily="49" charset="0"/>
+            </a:endParaRPr>
+          </a:p>
+          <a:p>
+            <a:r>
+              <a:rPr lang="en-US" b="1" dirty="0">
+                <a:solidFill>
+                  <a:srgbClr val="073642"/>
+                </a:solidFill>
+                <a:effectLst/>
+                <a:latin typeface="Consolas" panose="020B0609020204030204" pitchFamily="49" charset="0"/>
+              </a:rPr>
+              <a:t>char</a:t>
+            </a:r>
+            <a:r>
+              <a:rPr lang="en-US" b="0" dirty="0">
+                <a:solidFill>
+                  <a:srgbClr val="333333"/>
+                </a:solidFill>
+                <a:effectLst/>
+                <a:latin typeface="Consolas" panose="020B0609020204030204" pitchFamily="49" charset="0"/>
+              </a:rPr>
+              <a:t> </a:t>
+            </a:r>
+            <a:r>
+              <a:rPr lang="en-US" b="0" dirty="0" err="1">
+                <a:solidFill>
+                  <a:srgbClr val="268BD2"/>
+                </a:solidFill>
+                <a:effectLst/>
+                <a:latin typeface="Consolas" panose="020B0609020204030204" pitchFamily="49" charset="0"/>
+              </a:rPr>
+              <a:t>newLine</a:t>
+            </a:r>
+            <a:r>
+              <a:rPr lang="en-US" b="0" dirty="0">
+                <a:solidFill>
+                  <a:srgbClr val="333333"/>
+                </a:solidFill>
+                <a:effectLst/>
+                <a:latin typeface="Consolas" panose="020B0609020204030204" pitchFamily="49" charset="0"/>
+              </a:rPr>
+              <a:t> </a:t>
+            </a:r>
+            <a:r>
+              <a:rPr lang="en-US" b="0" dirty="0">
+                <a:solidFill>
+                  <a:srgbClr val="859900"/>
+                </a:solidFill>
+                <a:effectLst/>
+                <a:latin typeface="Consolas" panose="020B0609020204030204" pitchFamily="49" charset="0"/>
+              </a:rPr>
+              <a:t>=</a:t>
+            </a:r>
+            <a:r>
+              <a:rPr lang="en-US" b="0" dirty="0">
+                <a:solidFill>
+                  <a:srgbClr val="333333"/>
+                </a:solidFill>
+                <a:effectLst/>
+                <a:latin typeface="Consolas" panose="020B0609020204030204" pitchFamily="49" charset="0"/>
+              </a:rPr>
+              <a:t> </a:t>
+            </a:r>
+            <a:r>
+              <a:rPr lang="en-US" b="0" dirty="0">
+                <a:solidFill>
+                  <a:srgbClr val="2AA198"/>
+                </a:solidFill>
+                <a:effectLst/>
+                <a:latin typeface="Consolas" panose="020B0609020204030204" pitchFamily="49" charset="0"/>
+              </a:rPr>
+              <a:t>'</a:t>
+            </a:r>
+            <a:r>
+              <a:rPr lang="en-US" b="0" dirty="0">
+                <a:solidFill>
+                  <a:srgbClr val="CB4B16"/>
+                </a:solidFill>
+                <a:effectLst/>
+                <a:latin typeface="Consolas" panose="020B0609020204030204" pitchFamily="49" charset="0"/>
+              </a:rPr>
+              <a:t>\n</a:t>
+            </a:r>
+            <a:r>
+              <a:rPr lang="en-US" b="0" dirty="0">
+                <a:solidFill>
+                  <a:srgbClr val="2AA198"/>
+                </a:solidFill>
+                <a:effectLst/>
+                <a:latin typeface="Consolas" panose="020B0609020204030204" pitchFamily="49" charset="0"/>
+              </a:rPr>
+              <a:t>'</a:t>
+            </a:r>
+            <a:r>
+              <a:rPr lang="en-US" b="0" dirty="0">
+                <a:solidFill>
+                  <a:srgbClr val="333333"/>
+                </a:solidFill>
+                <a:effectLst/>
+                <a:latin typeface="Consolas" panose="020B0609020204030204" pitchFamily="49" charset="0"/>
+              </a:rPr>
+              <a:t>; </a:t>
+            </a:r>
+            <a:r>
+              <a:rPr lang="en-US" b="0" i="1" dirty="0">
+                <a:solidFill>
+                  <a:srgbClr val="93A1A1"/>
+                </a:solidFill>
+                <a:effectLst/>
+                <a:latin typeface="Consolas" panose="020B0609020204030204" pitchFamily="49" charset="0"/>
+              </a:rPr>
+              <a:t>//the invisible newline character</a:t>
+            </a:r>
+            <a:endParaRPr lang="en-US" b="0" dirty="0">
+              <a:solidFill>
+                <a:srgbClr val="333333"/>
+              </a:solidFill>
+              <a:effectLst/>
+              <a:latin typeface="Consolas" panose="020B0609020204030204" pitchFamily="49" charset="0"/>
+            </a:endParaRPr>
+          </a:p>
+          <a:p>
+            <a:r>
+              <a:rPr lang="en-US" b="1" dirty="0">
+                <a:solidFill>
+                  <a:srgbClr val="073642"/>
+                </a:solidFill>
+                <a:effectLst/>
+                <a:latin typeface="Consolas" panose="020B0609020204030204" pitchFamily="49" charset="0"/>
+              </a:rPr>
+              <a:t>char</a:t>
+            </a:r>
+            <a:r>
+              <a:rPr lang="en-US" b="0" dirty="0">
+                <a:solidFill>
+                  <a:srgbClr val="333333"/>
+                </a:solidFill>
+                <a:effectLst/>
+                <a:latin typeface="Consolas" panose="020B0609020204030204" pitchFamily="49" charset="0"/>
+              </a:rPr>
+              <a:t> </a:t>
+            </a:r>
+            <a:r>
+              <a:rPr lang="en-US" b="0" dirty="0">
+                <a:solidFill>
+                  <a:srgbClr val="268BD2"/>
+                </a:solidFill>
+                <a:effectLst/>
+                <a:latin typeface="Consolas" panose="020B0609020204030204" pitchFamily="49" charset="0"/>
+              </a:rPr>
+              <a:t>myChar2</a:t>
+            </a:r>
+            <a:r>
+              <a:rPr lang="en-US" b="0" dirty="0">
+                <a:solidFill>
+                  <a:srgbClr val="333333"/>
+                </a:solidFill>
+                <a:effectLst/>
+                <a:latin typeface="Consolas" panose="020B0609020204030204" pitchFamily="49" charset="0"/>
+              </a:rPr>
+              <a:t> </a:t>
+            </a:r>
+            <a:r>
+              <a:rPr lang="en-US" b="0" dirty="0">
+                <a:solidFill>
+                  <a:srgbClr val="859900"/>
+                </a:solidFill>
+                <a:effectLst/>
+                <a:latin typeface="Consolas" panose="020B0609020204030204" pitchFamily="49" charset="0"/>
+              </a:rPr>
+              <a:t>=</a:t>
+            </a:r>
+            <a:r>
+              <a:rPr lang="en-US" b="0" dirty="0">
+                <a:solidFill>
+                  <a:srgbClr val="333333"/>
+                </a:solidFill>
+                <a:effectLst/>
+                <a:latin typeface="Consolas" panose="020B0609020204030204" pitchFamily="49" charset="0"/>
+              </a:rPr>
+              <a:t> </a:t>
+            </a:r>
+            <a:r>
+              <a:rPr lang="en-US" b="0" dirty="0">
+                <a:solidFill>
+                  <a:srgbClr val="D33682"/>
+                </a:solidFill>
+                <a:effectLst/>
+                <a:latin typeface="Consolas" panose="020B0609020204030204" pitchFamily="49" charset="0"/>
+              </a:rPr>
+              <a:t>57</a:t>
+            </a:r>
+            <a:r>
+              <a:rPr lang="en-US" b="0" dirty="0">
+                <a:solidFill>
+                  <a:srgbClr val="333333"/>
+                </a:solidFill>
+                <a:effectLst/>
+                <a:latin typeface="Consolas" panose="020B0609020204030204" pitchFamily="49" charset="0"/>
+              </a:rPr>
+              <a:t>; </a:t>
+            </a:r>
+            <a:r>
+              <a:rPr lang="en-US" b="0" i="1" dirty="0">
+                <a:solidFill>
+                  <a:srgbClr val="93A1A1"/>
+                </a:solidFill>
+                <a:effectLst/>
+                <a:latin typeface="Consolas" panose="020B0609020204030204" pitchFamily="49" charset="0"/>
+              </a:rPr>
+              <a:t>// bad idea! It sets the value to the character ‘9’</a:t>
+            </a:r>
+            <a:endParaRPr lang="en-US" b="0" dirty="0">
+              <a:solidFill>
+                <a:srgbClr val="333333"/>
+              </a:solidFill>
+              <a:effectLst/>
+              <a:latin typeface="Consolas" panose="020B0609020204030204" pitchFamily="49" charset="0"/>
+            </a:endParaRPr>
+          </a:p>
+          <a:p>
+            <a:r>
+              <a:rPr lang="en-US" b="1" dirty="0">
+                <a:solidFill>
+                  <a:srgbClr val="073642"/>
+                </a:solidFill>
+                <a:effectLst/>
+                <a:latin typeface="Consolas" panose="020B0609020204030204" pitchFamily="49" charset="0"/>
+              </a:rPr>
+              <a:t>char</a:t>
+            </a:r>
+            <a:r>
+              <a:rPr lang="en-US" b="0" dirty="0">
+                <a:solidFill>
+                  <a:srgbClr val="333333"/>
+                </a:solidFill>
+                <a:effectLst/>
+                <a:latin typeface="Consolas" panose="020B0609020204030204" pitchFamily="49" charset="0"/>
+              </a:rPr>
+              <a:t> </a:t>
+            </a:r>
+            <a:r>
+              <a:rPr lang="en-US" b="0" dirty="0">
+                <a:solidFill>
+                  <a:srgbClr val="268BD2"/>
+                </a:solidFill>
+                <a:effectLst/>
+                <a:latin typeface="Consolas" panose="020B0609020204030204" pitchFamily="49" charset="0"/>
+              </a:rPr>
+              <a:t>what</a:t>
+            </a:r>
+            <a:r>
+              <a:rPr lang="en-US" b="0" dirty="0">
+                <a:solidFill>
+                  <a:srgbClr val="333333"/>
+                </a:solidFill>
+                <a:effectLst/>
+                <a:latin typeface="Consolas" panose="020B0609020204030204" pitchFamily="49" charset="0"/>
+              </a:rPr>
+              <a:t> </a:t>
+            </a:r>
+            <a:r>
+              <a:rPr lang="en-US" b="0" dirty="0">
+                <a:solidFill>
+                  <a:srgbClr val="859900"/>
+                </a:solidFill>
+                <a:effectLst/>
+                <a:latin typeface="Consolas" panose="020B0609020204030204" pitchFamily="49" charset="0"/>
+              </a:rPr>
+              <a:t>=</a:t>
+            </a:r>
+            <a:r>
+              <a:rPr lang="en-US" b="0" dirty="0">
+                <a:solidFill>
+                  <a:srgbClr val="333333"/>
+                </a:solidFill>
+                <a:effectLst/>
+                <a:latin typeface="Consolas" panose="020B0609020204030204" pitchFamily="49" charset="0"/>
+              </a:rPr>
+              <a:t> (</a:t>
+            </a:r>
+            <a:r>
+              <a:rPr lang="en-US" b="1" dirty="0">
+                <a:solidFill>
+                  <a:srgbClr val="073642"/>
+                </a:solidFill>
+                <a:effectLst/>
+                <a:latin typeface="Consolas" panose="020B0609020204030204" pitchFamily="49" charset="0"/>
+              </a:rPr>
+              <a:t>char</a:t>
+            </a:r>
+            <a:r>
+              <a:rPr lang="en-US" b="0" dirty="0">
+                <a:solidFill>
+                  <a:srgbClr val="333333"/>
+                </a:solidFill>
+                <a:effectLst/>
+                <a:latin typeface="Consolas" panose="020B0609020204030204" pitchFamily="49" charset="0"/>
+              </a:rPr>
+              <a:t>)(</a:t>
+            </a:r>
+            <a:r>
+              <a:rPr lang="en-US" b="0" dirty="0">
+                <a:solidFill>
+                  <a:srgbClr val="2AA198"/>
+                </a:solidFill>
+                <a:effectLst/>
+                <a:latin typeface="Consolas" panose="020B0609020204030204" pitchFamily="49" charset="0"/>
+              </a:rPr>
+              <a:t>'A'</a:t>
+            </a:r>
+            <a:r>
+              <a:rPr lang="en-US" b="0" dirty="0">
+                <a:solidFill>
+                  <a:srgbClr val="333333"/>
+                </a:solidFill>
+                <a:effectLst/>
+                <a:latin typeface="Consolas" panose="020B0609020204030204" pitchFamily="49" charset="0"/>
+              </a:rPr>
+              <a:t> </a:t>
+            </a:r>
+            <a:r>
+              <a:rPr lang="en-US" b="0" dirty="0">
+                <a:solidFill>
+                  <a:srgbClr val="859900"/>
+                </a:solidFill>
+                <a:effectLst/>
+                <a:latin typeface="Consolas" panose="020B0609020204030204" pitchFamily="49" charset="0"/>
+              </a:rPr>
+              <a:t>+</a:t>
+            </a:r>
+            <a:r>
+              <a:rPr lang="en-US" b="0" dirty="0">
+                <a:solidFill>
+                  <a:srgbClr val="333333"/>
+                </a:solidFill>
+                <a:effectLst/>
+                <a:latin typeface="Consolas" panose="020B0609020204030204" pitchFamily="49" charset="0"/>
+              </a:rPr>
+              <a:t> </a:t>
+            </a:r>
+            <a:r>
+              <a:rPr lang="en-US" b="0" dirty="0">
+                <a:solidFill>
+                  <a:srgbClr val="D33682"/>
+                </a:solidFill>
+                <a:effectLst/>
+                <a:latin typeface="Consolas" panose="020B0609020204030204" pitchFamily="49" charset="0"/>
+              </a:rPr>
+              <a:t>2</a:t>
+            </a:r>
+            <a:r>
+              <a:rPr lang="en-US" b="0" dirty="0">
+                <a:solidFill>
+                  <a:srgbClr val="333333"/>
+                </a:solidFill>
+                <a:effectLst/>
+                <a:latin typeface="Consolas" panose="020B0609020204030204" pitchFamily="49" charset="0"/>
+              </a:rPr>
+              <a:t>);  </a:t>
+            </a:r>
+            <a:r>
+              <a:rPr lang="en-US" b="0" i="1" dirty="0">
+                <a:solidFill>
+                  <a:srgbClr val="93A1A1"/>
+                </a:solidFill>
+                <a:effectLst/>
+                <a:latin typeface="Consolas" panose="020B0609020204030204" pitchFamily="49" charset="0"/>
+              </a:rPr>
+              <a:t>// what is now ‘C’ (used in things like the Caesar cipher)</a:t>
+            </a:r>
+            <a:endParaRPr lang="en-US" b="0" dirty="0">
+              <a:solidFill>
+                <a:srgbClr val="333333"/>
+              </a:solidFill>
+              <a:effectLst/>
+              <a:latin typeface="Consolas" panose="020B0609020204030204" pitchFamily="49" charset="0"/>
+            </a:endParaRPr>
           </a:p>
         </p:txBody>
       </p:sp>
@@ -6899,14 +7348,14 @@
   <p:clrMapOvr>
     <a:masterClrMapping/>
   </p:clrMapOvr>
-  <mc:AlternateContent xmlns:mc="http://schemas.openxmlformats.org/markup-compatibility/2006" xmlns:p14="http://schemas.microsoft.com/office/powerpoint/2010/main">
-    <mc:Choice Requires="p14">
-      <p:transition p14:dur="300">
+  <mc:AlternateContent xmlns:mc="http://schemas.openxmlformats.org/markup-compatibility/2006">
+    <mc:Choice xmlns:p14="http://schemas.microsoft.com/office/powerpoint/2010/main" Requires="p14">
+      <p:transition p14:dur="300" advTm="182518">
         <p:fade/>
       </p:transition>
     </mc:Choice>
-    <mc:Fallback xmlns="">
-      <p:transition>
+    <mc:Fallback>
+      <p:transition advTm="182518">
         <p:fade/>
       </p:transition>
     </mc:Fallback>
@@ -7103,14 +7552,14 @@
   <p:clrMapOvr>
     <a:masterClrMapping/>
   </p:clrMapOvr>
-  <mc:AlternateContent xmlns:mc="http://schemas.openxmlformats.org/markup-compatibility/2006" xmlns:p14="http://schemas.microsoft.com/office/powerpoint/2010/main">
-    <mc:Choice Requires="p14">
-      <p:transition p14:dur="300">
+  <mc:AlternateContent xmlns:mc="http://schemas.openxmlformats.org/markup-compatibility/2006">
+    <mc:Choice xmlns:p14="http://schemas.microsoft.com/office/powerpoint/2010/main" Requires="p14">
+      <p:transition p14:dur="300" advTm="71759">
         <p:fade/>
       </p:transition>
     </mc:Choice>
-    <mc:Fallback xmlns="">
-      <p:transition>
+    <mc:Fallback>
+      <p:transition advTm="71759">
         <p:fade/>
       </p:transition>
     </mc:Fallback>
@@ -7719,7 +8168,7 @@
         <p:spPr>
           <a:xfrm>
             <a:off x="6908800" y="1776683"/>
-            <a:ext cx="6280728" cy="4186659"/>
+            <a:ext cx="6280728" cy="4032771"/>
           </a:xfrm>
         </p:spPr>
         <p:txBody>
@@ -7759,27 +8208,21 @@
             </a:r>
           </a:p>
           <a:p>
-            <a:pPr lvl="1"/>
-            <a:r>
+            <a:pPr marL="699614" lvl="1" indent="0">
+              <a:buNone/>
+            </a:pPr>
+            <a:br>
               <a:rPr lang="en-US" dirty="0">
                 <a:latin typeface="Consolas" panose="020B0609020204030204" pitchFamily="49" charset="0"/>
                 <a:cs typeface="Consolas" panose="020B0609020204030204" pitchFamily="49" charset="0"/>
               </a:rPr>
-              <a:t>char c = ‘C’;</a:t>
-            </a:r>
-          </a:p>
-          <a:p>
-            <a:pPr lvl="1"/>
-            <a:r>
+            </a:br>
+            <a:br>
               <a:rPr lang="en-US" dirty="0">
                 <a:latin typeface="Consolas" panose="020B0609020204030204" pitchFamily="49" charset="0"/>
                 <a:cs typeface="Consolas" panose="020B0609020204030204" pitchFamily="49" charset="0"/>
               </a:rPr>
-              <a:t>char m = ‘M’;</a:t>
-            </a:r>
-          </a:p>
-          <a:p>
-            <a:pPr lvl="1"/>
+            </a:br>
             <a:endParaRPr lang="en-US" dirty="0">
               <a:latin typeface="Consolas" panose="020B0609020204030204" pitchFamily="49" charset="0"/>
               <a:cs typeface="Consolas" panose="020B0609020204030204" pitchFamily="49" charset="0"/>
@@ -7795,21 +8238,6 @@
             </a:r>
           </a:p>
           <a:p>
-            <a:pPr lvl="1"/>
-            <a:r>
-              <a:rPr lang="en-US" dirty="0">
-                <a:latin typeface="Consolas" panose="020B0609020204030204" pitchFamily="49" charset="0"/>
-                <a:cs typeface="Consolas" panose="020B0609020204030204" pitchFamily="49" charset="0"/>
-              </a:rPr>
-              <a:t>String mascot = </a:t>
-            </a:r>
-            <a:r>
-              <a:rPr lang="en-US">
-                <a:latin typeface="Consolas" panose="020B0609020204030204" pitchFamily="49" charset="0"/>
-                <a:cs typeface="Consolas" panose="020B0609020204030204" pitchFamily="49" charset="0"/>
-              </a:rPr>
-              <a:t>“CAM”;</a:t>
-            </a:r>
             <a:endParaRPr lang="en-US" dirty="0">
               <a:latin typeface="Consolas" panose="020B0609020204030204" pitchFamily="49" charset="0"/>
               <a:cs typeface="Consolas" panose="020B0609020204030204" pitchFamily="49" charset="0"/>
@@ -8380,7 +8808,314 @@
           </a:fontRef>
         </p:style>
       </p:cxnSp>
+      <p:sp>
+        <p:nvSpPr>
+          <p:cNvPr id="29" name="TextBox 28">
+            <a:extLst>
+              <a:ext uri="{FF2B5EF4-FFF2-40B4-BE49-F238E27FC236}">
+                <a16:creationId xmlns:a16="http://schemas.microsoft.com/office/drawing/2014/main" id="{71BC75C9-0949-4AAA-A7DA-12730A5BB8C6}"/>
+              </a:ext>
+            </a:extLst>
+          </p:cNvPr>
+          <p:cNvSpPr txBox="1"/>
+          <p:nvPr/>
+        </p:nvSpPr>
+        <p:spPr>
+          <a:xfrm>
+            <a:off x="7477131" y="3831853"/>
+            <a:ext cx="2177293" cy="707886"/>
+          </a:xfrm>
+          <a:prstGeom prst="rect">
+            <a:avLst/>
+          </a:prstGeom>
+          <a:noFill/>
+        </p:spPr>
+        <p:txBody>
+          <a:bodyPr wrap="square">
+            <a:spAutoFit/>
+          </a:bodyPr>
+          <a:lstStyle/>
+          <a:p>
+            <a:r>
+              <a:rPr lang="fr-FR" b="1" dirty="0">
+                <a:solidFill>
+                  <a:srgbClr val="073642"/>
+                </a:solidFill>
+                <a:effectLst/>
+                <a:latin typeface="Consolas" panose="020B0609020204030204" pitchFamily="49" charset="0"/>
+              </a:rPr>
+              <a:t>char</a:t>
+            </a:r>
+            <a:r>
+              <a:rPr lang="fr-FR" b="0" dirty="0">
+                <a:solidFill>
+                  <a:srgbClr val="333333"/>
+                </a:solidFill>
+                <a:effectLst/>
+                <a:latin typeface="Consolas" panose="020B0609020204030204" pitchFamily="49" charset="0"/>
+              </a:rPr>
+              <a:t> </a:t>
+            </a:r>
+            <a:r>
+              <a:rPr lang="fr-FR" b="0" dirty="0">
+                <a:solidFill>
+                  <a:srgbClr val="268BD2"/>
+                </a:solidFill>
+                <a:effectLst/>
+                <a:latin typeface="Consolas" panose="020B0609020204030204" pitchFamily="49" charset="0"/>
+              </a:rPr>
+              <a:t>c</a:t>
+            </a:r>
+            <a:r>
+              <a:rPr lang="fr-FR" b="0" dirty="0">
+                <a:solidFill>
+                  <a:srgbClr val="333333"/>
+                </a:solidFill>
+                <a:effectLst/>
+                <a:latin typeface="Consolas" panose="020B0609020204030204" pitchFamily="49" charset="0"/>
+              </a:rPr>
+              <a:t> </a:t>
+            </a:r>
+            <a:r>
+              <a:rPr lang="fr-FR" b="0" dirty="0">
+                <a:solidFill>
+                  <a:srgbClr val="859900"/>
+                </a:solidFill>
+                <a:effectLst/>
+                <a:latin typeface="Consolas" panose="020B0609020204030204" pitchFamily="49" charset="0"/>
+              </a:rPr>
+              <a:t>=</a:t>
+            </a:r>
+            <a:r>
+              <a:rPr lang="fr-FR" b="0" dirty="0">
+                <a:solidFill>
+                  <a:srgbClr val="333333"/>
+                </a:solidFill>
+                <a:effectLst/>
+                <a:latin typeface="Consolas" panose="020B0609020204030204" pitchFamily="49" charset="0"/>
+              </a:rPr>
+              <a:t> </a:t>
+            </a:r>
+            <a:r>
+              <a:rPr lang="fr-FR" b="0" dirty="0">
+                <a:solidFill>
+                  <a:srgbClr val="2AA198"/>
+                </a:solidFill>
+                <a:effectLst/>
+                <a:latin typeface="Consolas" panose="020B0609020204030204" pitchFamily="49" charset="0"/>
+              </a:rPr>
+              <a:t>'C'</a:t>
+            </a:r>
+            <a:r>
+              <a:rPr lang="fr-FR" b="0" dirty="0">
+                <a:solidFill>
+                  <a:srgbClr val="333333"/>
+                </a:solidFill>
+                <a:effectLst/>
+                <a:latin typeface="Consolas" panose="020B0609020204030204" pitchFamily="49" charset="0"/>
+              </a:rPr>
+              <a:t>;</a:t>
+            </a:r>
+          </a:p>
+          <a:p>
+            <a:r>
+              <a:rPr lang="fr-FR" b="1" dirty="0">
+                <a:solidFill>
+                  <a:srgbClr val="073642"/>
+                </a:solidFill>
+                <a:effectLst/>
+                <a:latin typeface="Consolas" panose="020B0609020204030204" pitchFamily="49" charset="0"/>
+              </a:rPr>
+              <a:t>char</a:t>
+            </a:r>
+            <a:r>
+              <a:rPr lang="fr-FR" b="0" dirty="0">
+                <a:solidFill>
+                  <a:srgbClr val="333333"/>
+                </a:solidFill>
+                <a:effectLst/>
+                <a:latin typeface="Consolas" panose="020B0609020204030204" pitchFamily="49" charset="0"/>
+              </a:rPr>
+              <a:t> </a:t>
+            </a:r>
+            <a:r>
+              <a:rPr lang="fr-FR" b="0" dirty="0">
+                <a:solidFill>
+                  <a:srgbClr val="268BD2"/>
+                </a:solidFill>
+                <a:effectLst/>
+                <a:latin typeface="Consolas" panose="020B0609020204030204" pitchFamily="49" charset="0"/>
+              </a:rPr>
+              <a:t>m</a:t>
+            </a:r>
+            <a:r>
+              <a:rPr lang="fr-FR" b="0" dirty="0">
+                <a:solidFill>
+                  <a:srgbClr val="333333"/>
+                </a:solidFill>
+                <a:effectLst/>
+                <a:latin typeface="Consolas" panose="020B0609020204030204" pitchFamily="49" charset="0"/>
+              </a:rPr>
+              <a:t> </a:t>
+            </a:r>
+            <a:r>
+              <a:rPr lang="fr-FR" b="0" dirty="0">
+                <a:solidFill>
+                  <a:srgbClr val="859900"/>
+                </a:solidFill>
+                <a:effectLst/>
+                <a:latin typeface="Consolas" panose="020B0609020204030204" pitchFamily="49" charset="0"/>
+              </a:rPr>
+              <a:t>=</a:t>
+            </a:r>
+            <a:r>
+              <a:rPr lang="fr-FR" b="0" dirty="0">
+                <a:solidFill>
+                  <a:srgbClr val="333333"/>
+                </a:solidFill>
+                <a:effectLst/>
+                <a:latin typeface="Consolas" panose="020B0609020204030204" pitchFamily="49" charset="0"/>
+              </a:rPr>
+              <a:t> </a:t>
+            </a:r>
+            <a:r>
+              <a:rPr lang="fr-FR" b="0" dirty="0">
+                <a:solidFill>
+                  <a:srgbClr val="2AA198"/>
+                </a:solidFill>
+                <a:effectLst/>
+                <a:latin typeface="Consolas" panose="020B0609020204030204" pitchFamily="49" charset="0"/>
+              </a:rPr>
+              <a:t>'M'</a:t>
+            </a:r>
+            <a:r>
+              <a:rPr lang="fr-FR" b="0" dirty="0">
+                <a:solidFill>
+                  <a:srgbClr val="333333"/>
+                </a:solidFill>
+                <a:effectLst/>
+                <a:latin typeface="Consolas" panose="020B0609020204030204" pitchFamily="49" charset="0"/>
+              </a:rPr>
+              <a:t>;</a:t>
+            </a:r>
+          </a:p>
+        </p:txBody>
+      </p:sp>
+      <p:sp>
+        <p:nvSpPr>
+          <p:cNvPr id="31" name="TextBox 30">
+            <a:extLst>
+              <a:ext uri="{FF2B5EF4-FFF2-40B4-BE49-F238E27FC236}">
+                <a16:creationId xmlns:a16="http://schemas.microsoft.com/office/drawing/2014/main" id="{5007D7CE-7356-4E97-8444-D5343B0D19E6}"/>
+              </a:ext>
+            </a:extLst>
+          </p:cNvPr>
+          <p:cNvSpPr txBox="1"/>
+          <p:nvPr/>
+        </p:nvSpPr>
+        <p:spPr>
+          <a:xfrm>
+            <a:off x="7470619" y="5337803"/>
+            <a:ext cx="6910464" cy="400110"/>
+          </a:xfrm>
+          <a:prstGeom prst="rect">
+            <a:avLst/>
+          </a:prstGeom>
+          <a:noFill/>
+        </p:spPr>
+        <p:txBody>
+          <a:bodyPr wrap="square">
+            <a:spAutoFit/>
+          </a:bodyPr>
+          <a:lstStyle/>
+          <a:p>
+            <a:r>
+              <a:rPr lang="en-US" b="1" dirty="0">
+                <a:solidFill>
+                  <a:srgbClr val="268BD2"/>
+                </a:solidFill>
+                <a:effectLst/>
+                <a:latin typeface="Consolas" panose="020B0609020204030204" pitchFamily="49" charset="0"/>
+              </a:rPr>
+              <a:t>String</a:t>
+            </a:r>
+            <a:r>
+              <a:rPr lang="en-US" b="0" dirty="0">
+                <a:solidFill>
+                  <a:srgbClr val="333333"/>
+                </a:solidFill>
+                <a:effectLst/>
+                <a:latin typeface="Consolas" panose="020B0609020204030204" pitchFamily="49" charset="0"/>
+              </a:rPr>
+              <a:t> </a:t>
+            </a:r>
+            <a:r>
+              <a:rPr lang="en-US" b="0" dirty="0">
+                <a:solidFill>
+                  <a:srgbClr val="268BD2"/>
+                </a:solidFill>
+                <a:effectLst/>
+                <a:latin typeface="Consolas" panose="020B0609020204030204" pitchFamily="49" charset="0"/>
+              </a:rPr>
+              <a:t>mascot</a:t>
+            </a:r>
+            <a:r>
+              <a:rPr lang="en-US" b="0" dirty="0">
+                <a:solidFill>
+                  <a:srgbClr val="333333"/>
+                </a:solidFill>
+                <a:effectLst/>
+                <a:latin typeface="Consolas" panose="020B0609020204030204" pitchFamily="49" charset="0"/>
+              </a:rPr>
+              <a:t> </a:t>
+            </a:r>
+            <a:r>
+              <a:rPr lang="en-US" b="0" dirty="0">
+                <a:solidFill>
+                  <a:srgbClr val="859900"/>
+                </a:solidFill>
+                <a:effectLst/>
+                <a:latin typeface="Consolas" panose="020B0609020204030204" pitchFamily="49" charset="0"/>
+              </a:rPr>
+              <a:t>=</a:t>
+            </a:r>
+            <a:r>
+              <a:rPr lang="en-US" b="0" dirty="0">
+                <a:solidFill>
+                  <a:srgbClr val="333333"/>
+                </a:solidFill>
+                <a:effectLst/>
+                <a:latin typeface="Consolas" panose="020B0609020204030204" pitchFamily="49" charset="0"/>
+              </a:rPr>
+              <a:t> </a:t>
+            </a:r>
+            <a:r>
+              <a:rPr lang="en-US" b="0" dirty="0">
+                <a:solidFill>
+                  <a:srgbClr val="2AA198"/>
+                </a:solidFill>
+                <a:effectLst/>
+                <a:latin typeface="Consolas" panose="020B0609020204030204" pitchFamily="49" charset="0"/>
+              </a:rPr>
+              <a:t>"CAM"</a:t>
+            </a:r>
+            <a:r>
+              <a:rPr lang="en-US" b="0" dirty="0">
+                <a:solidFill>
+                  <a:srgbClr val="333333"/>
+                </a:solidFill>
+                <a:effectLst/>
+                <a:latin typeface="Consolas" panose="020B0609020204030204" pitchFamily="49" charset="0"/>
+              </a:rPr>
+              <a:t>;</a:t>
+            </a:r>
+          </a:p>
+        </p:txBody>
+      </p:sp>
     </p:spTree>
+    <p:custDataLst>
+      <p:tags r:id="rId1"/>
+    </p:custDataLst>
     <p:extLst>
       <p:ext uri="{BB962C8B-B14F-4D97-AF65-F5344CB8AC3E}">
         <p14:creationId xmlns:p14="http://schemas.microsoft.com/office/powerpoint/2010/main" val="1168442721"/>
@@ -8390,14 +9125,14 @@
   <p:clrMapOvr>
     <a:masterClrMapping/>
   </p:clrMapOvr>
-  <mc:AlternateContent xmlns:mc="http://schemas.openxmlformats.org/markup-compatibility/2006" xmlns:p14="http://schemas.microsoft.com/office/powerpoint/2010/main">
-    <mc:Choice Requires="p14">
-      <p:transition p14:dur="300">
+  <mc:AlternateContent xmlns:mc="http://schemas.openxmlformats.org/markup-compatibility/2006">
+    <mc:Choice xmlns:p14="http://schemas.microsoft.com/office/powerpoint/2010/main" Requires="p14">
+      <p:transition p14:dur="300" advTm="84878">
         <p:fade/>
       </p:transition>
     </mc:Choice>
-    <mc:Fallback xmlns="">
-      <p:transition>
+    <mc:Fallback>
+      <p:transition advTm="84878">
         <p:fade/>
       </p:transition>
     </mc:Fallback>
@@ -8965,8 +9700,8 @@
         </p:nvSpPr>
         <p:spPr>
           <a:xfrm>
-            <a:off x="7305627" y="1766200"/>
-            <a:ext cx="5280770" cy="5047985"/>
+            <a:off x="7440538" y="466904"/>
+            <a:ext cx="5280770" cy="4894097"/>
           </a:xfrm>
         </p:spPr>
         <p:txBody>
@@ -9002,24 +9737,123 @@
           <a:p>
             <a:r>
               <a:rPr lang="en-US" b="1" dirty="0">
+                <a:solidFill>
+                  <a:srgbClr val="073642"/>
+                </a:solidFill>
+                <a:effectLst/>
                 <a:latin typeface="Consolas" panose="020B0609020204030204" pitchFamily="49" charset="0"/>
-                <a:cs typeface="Consolas" panose="020B0609020204030204" pitchFamily="49" charset="0"/>
               </a:rPr>
-              <a:t>char character = </a:t>
-            </a:r>
-            <a:r>
-              <a:rPr lang="en-US" b="1" dirty="0" err="1">
+              <a:t>char</a:t>
+            </a:r>
+            <a:r>
+              <a:rPr lang="en-US" b="0" dirty="0">
+                <a:solidFill>
+                  <a:srgbClr val="333333"/>
+                </a:solidFill>
+                <a:effectLst/>
                 <a:latin typeface="Consolas" panose="020B0609020204030204" pitchFamily="49" charset="0"/>
-                <a:cs typeface="Consolas" panose="020B0609020204030204" pitchFamily="49" charset="0"/>
               </a:rPr>
-              <a:t>mascot.charAt</a:t>
-            </a:r>
-            <a:r>
-              <a:rPr lang="en-US" b="1" dirty="0">
+              <a:t> </a:t>
+            </a:r>
+            <a:r>
+              <a:rPr lang="en-US" b="0" dirty="0">
+                <a:solidFill>
+                  <a:srgbClr val="268BD2"/>
+                </a:solidFill>
+                <a:effectLst/>
                 <a:latin typeface="Consolas" panose="020B0609020204030204" pitchFamily="49" charset="0"/>
-                <a:cs typeface="Consolas" panose="020B0609020204030204" pitchFamily="49" charset="0"/>
               </a:rPr>
-              <a:t>(2);</a:t>
+              <a:t>last</a:t>
+            </a:r>
+            <a:r>
+              <a:rPr lang="en-US" b="0" dirty="0">
+                <a:solidFill>
+                  <a:srgbClr val="333333"/>
+                </a:solidFill>
+                <a:effectLst/>
+                <a:latin typeface="Consolas" panose="020B0609020204030204" pitchFamily="49" charset="0"/>
+              </a:rPr>
+              <a:t> </a:t>
+            </a:r>
+            <a:r>
+              <a:rPr lang="en-US" b="0" dirty="0">
+                <a:solidFill>
+                  <a:srgbClr val="859900"/>
+                </a:solidFill>
+                <a:effectLst/>
+                <a:latin typeface="Consolas" panose="020B0609020204030204" pitchFamily="49" charset="0"/>
+              </a:rPr>
+              <a:t>=</a:t>
+            </a:r>
+            <a:r>
+              <a:rPr lang="en-US" b="0" dirty="0">
+                <a:solidFill>
+                  <a:srgbClr val="333333"/>
+                </a:solidFill>
+                <a:effectLst/>
+                <a:latin typeface="Consolas" panose="020B0609020204030204" pitchFamily="49" charset="0"/>
+              </a:rPr>
+              <a:t> </a:t>
+            </a:r>
+            <a:r>
+              <a:rPr lang="en-US" b="0" dirty="0" err="1">
+                <a:solidFill>
+                  <a:srgbClr val="268BD2"/>
+                </a:solidFill>
+                <a:effectLst/>
+                <a:latin typeface="Consolas" panose="020B0609020204030204" pitchFamily="49" charset="0"/>
+              </a:rPr>
+              <a:t>mascot</a:t>
+            </a:r>
+            <a:r>
+              <a:rPr lang="en-US" b="0" dirty="0" err="1">
+                <a:solidFill>
+                  <a:srgbClr val="333333"/>
+                </a:solidFill>
+                <a:effectLst/>
+                <a:latin typeface="Consolas" panose="020B0609020204030204" pitchFamily="49" charset="0"/>
+              </a:rPr>
+              <a:t>.</a:t>
+            </a:r>
+            <a:r>
+              <a:rPr lang="en-US" b="0" dirty="0" err="1">
+                <a:solidFill>
+                  <a:srgbClr val="268BD2"/>
+                </a:solidFill>
+                <a:effectLst/>
+                <a:latin typeface="Consolas" panose="020B0609020204030204" pitchFamily="49" charset="0"/>
+              </a:rPr>
+              <a:t>charAt</a:t>
+            </a:r>
+            <a:r>
+              <a:rPr lang="en-US" b="0" dirty="0">
+                <a:solidFill>
+                  <a:srgbClr val="333333"/>
+                </a:solidFill>
+                <a:effectLst/>
+                <a:latin typeface="Consolas" panose="020B0609020204030204" pitchFamily="49" charset="0"/>
+              </a:rPr>
+              <a:t>(</a:t>
+            </a:r>
+            <a:r>
+              <a:rPr lang="en-US" b="0" dirty="0">
+                <a:solidFill>
+                  <a:srgbClr val="D33682"/>
+                </a:solidFill>
+                <a:effectLst/>
+                <a:latin typeface="Consolas" panose="020B0609020204030204" pitchFamily="49" charset="0"/>
+              </a:rPr>
+              <a:t>2</a:t>
+            </a:r>
+            <a:r>
+              <a:rPr lang="en-US" b="0" dirty="0">
+                <a:solidFill>
+                  <a:srgbClr val="333333"/>
+                </a:solidFill>
+                <a:effectLst/>
+                <a:latin typeface="Consolas" panose="020B0609020204030204" pitchFamily="49" charset="0"/>
+              </a:rPr>
+              <a:t>);</a:t>
             </a:r>
           </a:p>
           <a:p>
@@ -9034,51 +9868,120 @@
               <a:rPr lang="en-US" dirty="0"/>
               <a:t>How many  characters?</a:t>
             </a:r>
-          </a:p>
-          <a:p>
-            <a:pPr lvl="1"/>
+            <a:br>
+              <a:rPr lang="en-US" dirty="0"/>
+            </a:br>
             <a:r>
               <a:rPr lang="en-US" b="1" dirty="0">
+                <a:solidFill>
+                  <a:srgbClr val="073642"/>
+                </a:solidFill>
+                <a:effectLst/>
                 <a:latin typeface="Consolas" panose="020B0609020204030204" pitchFamily="49" charset="0"/>
-                <a:cs typeface="Consolas" panose="020B0609020204030204" pitchFamily="49" charset="0"/>
               </a:rPr>
-              <a:t>int </a:t>
-            </a:r>
-            <a:r>
-              <a:rPr lang="en-US" b="1" dirty="0" err="1">
+              <a:t>int</a:t>
+            </a:r>
+            <a:r>
+              <a:rPr lang="en-US" b="0" dirty="0">
+                <a:solidFill>
+                  <a:srgbClr val="333333"/>
+                </a:solidFill>
+                <a:effectLst/>
                 <a:latin typeface="Consolas" panose="020B0609020204030204" pitchFamily="49" charset="0"/>
-                <a:cs typeface="Consolas" panose="020B0609020204030204" pitchFamily="49" charset="0"/>
+              </a:rPr>
+              <a:t> </a:t>
+            </a:r>
+            <a:r>
+              <a:rPr lang="en-US" b="0" dirty="0" err="1">
+                <a:solidFill>
+                  <a:srgbClr val="268BD2"/>
+                </a:solidFill>
+                <a:effectLst/>
+                <a:latin typeface="Consolas" panose="020B0609020204030204" pitchFamily="49" charset="0"/>
               </a:rPr>
               <a:t>len</a:t>
             </a:r>
             <a:r>
-              <a:rPr lang="en-US" b="1" dirty="0">
+              <a:rPr lang="en-US" b="0" dirty="0">
+                <a:solidFill>
+                  <a:srgbClr val="333333"/>
+                </a:solidFill>
+                <a:effectLst/>
                 <a:latin typeface="Consolas" panose="020B0609020204030204" pitchFamily="49" charset="0"/>
-                <a:cs typeface="Consolas" panose="020B0609020204030204" pitchFamily="49" charset="0"/>
               </a:rPr>
-              <a:t> = </a:t>
-            </a:r>
-            <a:r>
-              <a:rPr lang="en-US" b="1" dirty="0" err="1">
+              <a:t> </a:t>
+            </a:r>
+            <a:r>
+              <a:rPr lang="en-US" b="0" dirty="0">
+                <a:solidFill>
+                  <a:srgbClr val="859900"/>
+                </a:solidFill>
+                <a:effectLst/>
                 <a:latin typeface="Consolas" panose="020B0609020204030204" pitchFamily="49" charset="0"/>
-                <a:cs typeface="Consolas" panose="020B0609020204030204" pitchFamily="49" charset="0"/>
               </a:rPr>
-              <a:t>mascot.length</a:t>
-            </a:r>
-            <a:r>
-              <a:rPr lang="en-US" b="1" dirty="0">
+              <a:t>=</a:t>
+            </a:r>
+            <a:r>
+              <a:rPr lang="en-US" b="0" dirty="0">
+                <a:solidFill>
+                  <a:srgbClr val="333333"/>
+                </a:solidFill>
+                <a:effectLst/>
                 <a:latin typeface="Consolas" panose="020B0609020204030204" pitchFamily="49" charset="0"/>
-                <a:cs typeface="Consolas" panose="020B0609020204030204" pitchFamily="49" charset="0"/>
+              </a:rPr>
+              <a:t> </a:t>
+            </a:r>
+            <a:r>
+              <a:rPr lang="en-US" b="0" dirty="0" err="1">
+                <a:solidFill>
+                  <a:srgbClr val="268BD2"/>
+                </a:solidFill>
+                <a:effectLst/>
+                <a:latin typeface="Consolas" panose="020B0609020204030204" pitchFamily="49" charset="0"/>
+              </a:rPr>
+              <a:t>mascot</a:t>
+            </a:r>
+            <a:r>
+              <a:rPr lang="en-US" b="0" dirty="0" err="1">
+                <a:solidFill>
+                  <a:srgbClr val="333333"/>
+                </a:solidFill>
+                <a:effectLst/>
+                <a:latin typeface="Consolas" panose="020B0609020204030204" pitchFamily="49" charset="0"/>
+              </a:rPr>
+              <a:t>.</a:t>
+            </a:r>
+            <a:r>
+              <a:rPr lang="en-US" b="0" dirty="0" err="1">
+                <a:solidFill>
+                  <a:srgbClr val="268BD2"/>
+                </a:solidFill>
+                <a:effectLst/>
+                <a:latin typeface="Consolas" panose="020B0609020204030204" pitchFamily="49" charset="0"/>
+              </a:rPr>
+              <a:t>length</a:t>
+            </a:r>
+            <a:r>
+              <a:rPr lang="en-US" b="0" dirty="0">
+                <a:solidFill>
+                  <a:srgbClr val="333333"/>
+                </a:solidFill>
+                <a:effectLst/>
+                <a:latin typeface="Consolas" panose="020B0609020204030204" pitchFamily="49" charset="0"/>
               </a:rPr>
               <a:t>(); </a:t>
             </a:r>
             <a:r>
-              <a:rPr lang="en-US" dirty="0">
+              <a:rPr lang="en-US" b="0" i="1" dirty="0">
+                <a:solidFill>
+                  <a:srgbClr val="93A1A1"/>
+                </a:solidFill>
+                <a:effectLst/>
                 <a:latin typeface="Consolas" panose="020B0609020204030204" pitchFamily="49" charset="0"/>
-                <a:cs typeface="Consolas" panose="020B0609020204030204" pitchFamily="49" charset="0"/>
               </a:rPr>
               <a:t>// 3</a:t>
             </a:r>
+            <a:endParaRPr lang="en-US" dirty="0"/>
           </a:p>
           <a:p>
             <a:r>
@@ -9698,19 +10601,25 @@
   <p:clrMapOvr>
     <a:masterClrMapping/>
   </p:clrMapOvr>
-  <mc:AlternateContent xmlns:mc="http://schemas.openxmlformats.org/markup-compatibility/2006" xmlns:p14="http://schemas.microsoft.com/office/powerpoint/2010/main">
-    <mc:Choice Requires="p14">
-      <p:transition p14:dur="300">
+  <mc:AlternateContent xmlns:mc="http://schemas.openxmlformats.org/markup-compatibility/2006">
+    <mc:Choice xmlns:p14="http://schemas.microsoft.com/office/powerpoint/2010/main" Requires="p14">
+      <p:transition p14:dur="300" advTm="91031">
         <p:fade/>
       </p:transition>
     </mc:Choice>
-    <mc:Fallback xmlns="">
-      <p:transition>
+    <mc:Fallback>
+      <p:transition advTm="91031">
         <p:fade/>
       </p:transition>
     </mc:Fallback>
   </mc:AlternateContent>
 </p:sld>
+</file>
+
+<file path=ppt/tags/tag1.xml><?xml version="1.0" encoding="utf-8"?>
+<p:tagLst xmlns:a="http://schemas.openxmlformats.org/drawingml/2006/main" xmlns:r="http://schemas.openxmlformats.org/officeDocument/2006/relationships" xmlns:p="http://schemas.openxmlformats.org/presentationml/2006/main">
+  <p:tag name="TIMING" val="|10.1|10|32.8|3"/>
+</p:tagLst>
 </file>
 
 <file path=ppt/theme/theme1.xml><?xml version="1.0" encoding="utf-8"?>

</xml_diff>